<commit_message>
Final tweaks and improvements to the presentation and report
</commit_message>
<xml_diff>
--- a/Nishadh_Shrestha_Presentation.pptx
+++ b/Nishadh_Shrestha_Presentation.pptx
@@ -118,6 +118,11 @@
       </a:defRPr>
     </a:lvl9pPr>
   </p:defaultTextStyle>
+  <p:extLst>
+    <p:ext uri="{EFAFB233-063F-42B5-8137-9DF3F51BA10A}">
+      <p15:sldGuideLst xmlns:p15="http://schemas.microsoft.com/office/powerpoint/2012/main"/>
+    </p:ext>
+  </p:extLst>
 </p:presentation>
 </file>
 
@@ -5950,7 +5955,7 @@
           <a:p>
             <a:r>
               <a:rPr lang="en-US" dirty="0"/>
-              <a:t>Multivariate Analysis – Part 2</a:t>
+              <a:t>Bivariate Analysis – Part 3</a:t>
             </a:r>
           </a:p>
         </p:txBody>
@@ -6088,7 +6093,7 @@
           <a:p>
             <a:r>
               <a:rPr lang="en-US" dirty="0"/>
-              <a:t>Bivariate Analysis – Part 3</a:t>
+              <a:t>Bivariate Analysis – Part 4</a:t>
             </a:r>
           </a:p>
         </p:txBody>
@@ -6226,7 +6231,7 @@
           <a:p>
             <a:r>
               <a:rPr lang="en-US" dirty="0"/>
-              <a:t>Recommendation</a:t>
+              <a:t>Recommendations</a:t>
             </a:r>
           </a:p>
         </p:txBody>

</xml_diff>